<commit_message>
Tested gRPC service with BloomRPC
</commit_message>
<xml_diff>
--- a/Presentation.pptx
+++ b/Presentation.pptx
@@ -5,7 +5,7 @@
     <p:sldMasterId id="2147483712" r:id="rId4"/>
   </p:sldMasterIdLst>
   <p:notesMasterIdLst>
-    <p:notesMasterId r:id="rId15"/>
+    <p:notesMasterId r:id="rId23"/>
   </p:notesMasterIdLst>
   <p:sldIdLst>
     <p:sldId id="257" r:id="rId5"/>
@@ -18,6 +18,14 @@
     <p:sldId id="261" r:id="rId12"/>
     <p:sldId id="263" r:id="rId13"/>
     <p:sldId id="267" r:id="rId14"/>
+    <p:sldId id="268" r:id="rId15"/>
+    <p:sldId id="269" r:id="rId16"/>
+    <p:sldId id="270" r:id="rId17"/>
+    <p:sldId id="271" r:id="rId18"/>
+    <p:sldId id="272" r:id="rId19"/>
+    <p:sldId id="273" r:id="rId20"/>
+    <p:sldId id="274" r:id="rId21"/>
+    <p:sldId id="275" r:id="rId22"/>
   </p:sldIdLst>
   <p:sldSz cx="12192000" cy="6858000"/>
   <p:notesSz cx="6858000" cy="9144000"/>
@@ -4693,10 +4701,9 @@
           <a:lstStyle/>
           <a:p>
             <a:r>
-              <a:rPr lang="en-US"/>
+              <a:rPr lang="en-US" dirty="0"/>
               <a:t>METER READER</a:t>
             </a:r>
-            <a:endParaRPr lang="en-US" dirty="0"/>
           </a:p>
         </p:txBody>
       </p:sp>
@@ -4734,6 +4741,811 @@
     <p:extLst>
       <p:ext uri="{BB962C8B-B14F-4D97-AF65-F5344CB8AC3E}">
         <p14:creationId xmlns:p14="http://schemas.microsoft.com/office/powerpoint/2010/main" val="3770188862"/>
+      </p:ext>
+    </p:extLst>
+  </p:cSld>
+  <p:clrMapOvr>
+    <a:masterClrMapping/>
+  </p:clrMapOvr>
+</p:sld>
+</file>
+
+<file path=ppt/slides/slide11.xml><?xml version="1.0" encoding="utf-8"?>
+<p:sld xmlns:a="http://schemas.openxmlformats.org/drawingml/2006/main" xmlns:r="http://schemas.openxmlformats.org/officeDocument/2006/relationships" xmlns:p="http://schemas.openxmlformats.org/presentationml/2006/main">
+  <p:cSld>
+    <p:spTree>
+      <p:nvGrpSpPr>
+        <p:cNvPr id="1" name=""/>
+        <p:cNvGrpSpPr/>
+        <p:nvPr/>
+      </p:nvGrpSpPr>
+      <p:grpSpPr>
+        <a:xfrm>
+          <a:off x="0" y="0"/>
+          <a:ext cx="0" cy="0"/>
+          <a:chOff x="0" y="0"/>
+          <a:chExt cx="0" cy="0"/>
+        </a:xfrm>
+      </p:grpSpPr>
+      <p:sp>
+        <p:nvSpPr>
+          <p:cNvPr id="2" name="Title 1">
+            <a:extLst>
+              <a:ext uri="{FF2B5EF4-FFF2-40B4-BE49-F238E27FC236}">
+                <a16:creationId xmlns:a16="http://schemas.microsoft.com/office/drawing/2014/main" id="{7FD4AA9E-928E-45C2-9316-DFCC2B5F4FED}"/>
+              </a:ext>
+            </a:extLst>
+          </p:cNvPr>
+          <p:cNvSpPr>
+            <a:spLocks noGrp="1"/>
+          </p:cNvSpPr>
+          <p:nvPr>
+            <p:ph type="title"/>
+          </p:nvPr>
+        </p:nvSpPr>
+        <p:spPr>
+          <a:xfrm>
+            <a:off x="581192" y="702156"/>
+            <a:ext cx="11029616" cy="629586"/>
+          </a:xfrm>
+        </p:spPr>
+        <p:txBody>
+          <a:bodyPr/>
+          <a:lstStyle/>
+          <a:p>
+            <a:r>
+              <a:rPr lang="en-US" dirty="0"/>
+              <a:t>METER SERVICE</a:t>
+            </a:r>
+          </a:p>
+        </p:txBody>
+      </p:sp>
+      <p:pic>
+        <p:nvPicPr>
+          <p:cNvPr id="5" name="Picture 4">
+            <a:extLst>
+              <a:ext uri="{FF2B5EF4-FFF2-40B4-BE49-F238E27FC236}">
+                <a16:creationId xmlns:a16="http://schemas.microsoft.com/office/drawing/2014/main" id="{9C2F8D3C-4A58-4C3D-A7C5-C8175DD50CDB}"/>
+              </a:ext>
+            </a:extLst>
+          </p:cNvPr>
+          <p:cNvPicPr>
+            <a:picLocks noChangeAspect="1"/>
+          </p:cNvPicPr>
+          <p:nvPr/>
+        </p:nvPicPr>
+        <p:blipFill>
+          <a:blip r:embed="rId2"/>
+          <a:stretch>
+            <a:fillRect/>
+          </a:stretch>
+        </p:blipFill>
+        <p:spPr>
+          <a:xfrm>
+            <a:off x="0" y="1331742"/>
+            <a:ext cx="10065774" cy="5141741"/>
+          </a:xfrm>
+          <a:prstGeom prst="rect">
+            <a:avLst/>
+          </a:prstGeom>
+        </p:spPr>
+      </p:pic>
+    </p:spTree>
+    <p:extLst>
+      <p:ext uri="{BB962C8B-B14F-4D97-AF65-F5344CB8AC3E}">
+        <p14:creationId xmlns:p14="http://schemas.microsoft.com/office/powerpoint/2010/main" val="1696527935"/>
+      </p:ext>
+    </p:extLst>
+  </p:cSld>
+  <p:clrMapOvr>
+    <a:masterClrMapping/>
+  </p:clrMapOvr>
+</p:sld>
+</file>
+
+<file path=ppt/slides/slide12.xml><?xml version="1.0" encoding="utf-8"?>
+<p:sld xmlns:a="http://schemas.openxmlformats.org/drawingml/2006/main" xmlns:r="http://schemas.openxmlformats.org/officeDocument/2006/relationships" xmlns:p="http://schemas.openxmlformats.org/presentationml/2006/main">
+  <p:cSld>
+    <p:spTree>
+      <p:nvGrpSpPr>
+        <p:cNvPr id="1" name=""/>
+        <p:cNvGrpSpPr/>
+        <p:nvPr/>
+      </p:nvGrpSpPr>
+      <p:grpSpPr>
+        <a:xfrm>
+          <a:off x="0" y="0"/>
+          <a:ext cx="0" cy="0"/>
+          <a:chOff x="0" y="0"/>
+          <a:chExt cx="0" cy="0"/>
+        </a:xfrm>
+      </p:grpSpPr>
+      <p:sp>
+        <p:nvSpPr>
+          <p:cNvPr id="2" name="Title 1">
+            <a:extLst>
+              <a:ext uri="{FF2B5EF4-FFF2-40B4-BE49-F238E27FC236}">
+                <a16:creationId xmlns:a16="http://schemas.microsoft.com/office/drawing/2014/main" id="{D8B566CD-EAE3-42EF-BA11-C82509408D21}"/>
+              </a:ext>
+            </a:extLst>
+          </p:cNvPr>
+          <p:cNvSpPr>
+            <a:spLocks noGrp="1"/>
+          </p:cNvSpPr>
+          <p:nvPr>
+            <p:ph type="title"/>
+          </p:nvPr>
+        </p:nvSpPr>
+        <p:spPr>
+          <a:xfrm>
+            <a:off x="581192" y="702156"/>
+            <a:ext cx="11029616" cy="465462"/>
+          </a:xfrm>
+        </p:spPr>
+        <p:txBody>
+          <a:bodyPr>
+            <a:normAutofit fontScale="90000"/>
+          </a:bodyPr>
+          <a:lstStyle/>
+          <a:p>
+            <a:r>
+              <a:rPr lang="en-US" dirty="0"/>
+              <a:t>ADD PROTO</a:t>
+            </a:r>
+          </a:p>
+        </p:txBody>
+      </p:sp>
+      <p:pic>
+        <p:nvPicPr>
+          <p:cNvPr id="9" name="Picture 8">
+            <a:extLst>
+              <a:ext uri="{FF2B5EF4-FFF2-40B4-BE49-F238E27FC236}">
+                <a16:creationId xmlns:a16="http://schemas.microsoft.com/office/drawing/2014/main" id="{EE54B5FF-C837-4528-8647-028AA4679704}"/>
+              </a:ext>
+            </a:extLst>
+          </p:cNvPr>
+          <p:cNvPicPr>
+            <a:picLocks noChangeAspect="1"/>
+          </p:cNvPicPr>
+          <p:nvPr/>
+        </p:nvPicPr>
+        <p:blipFill>
+          <a:blip r:embed="rId2"/>
+          <a:stretch>
+            <a:fillRect/>
+          </a:stretch>
+        </p:blipFill>
+        <p:spPr>
+          <a:xfrm>
+            <a:off x="-47070" y="1219199"/>
+            <a:ext cx="6687197" cy="5682029"/>
+          </a:xfrm>
+          <a:prstGeom prst="rect">
+            <a:avLst/>
+          </a:prstGeom>
+        </p:spPr>
+      </p:pic>
+    </p:spTree>
+    <p:extLst>
+      <p:ext uri="{BB962C8B-B14F-4D97-AF65-F5344CB8AC3E}">
+        <p14:creationId xmlns:p14="http://schemas.microsoft.com/office/powerpoint/2010/main" val="3057632559"/>
+      </p:ext>
+    </p:extLst>
+  </p:cSld>
+  <p:clrMapOvr>
+    <a:masterClrMapping/>
+  </p:clrMapOvr>
+</p:sld>
+</file>
+
+<file path=ppt/slides/slide13.xml><?xml version="1.0" encoding="utf-8"?>
+<p:sld xmlns:a="http://schemas.openxmlformats.org/drawingml/2006/main" xmlns:r="http://schemas.openxmlformats.org/officeDocument/2006/relationships" xmlns:p="http://schemas.openxmlformats.org/presentationml/2006/main">
+  <p:cSld>
+    <p:spTree>
+      <p:nvGrpSpPr>
+        <p:cNvPr id="1" name=""/>
+        <p:cNvGrpSpPr/>
+        <p:nvPr/>
+      </p:nvGrpSpPr>
+      <p:grpSpPr>
+        <a:xfrm>
+          <a:off x="0" y="0"/>
+          <a:ext cx="0" cy="0"/>
+          <a:chOff x="0" y="0"/>
+          <a:chExt cx="0" cy="0"/>
+        </a:xfrm>
+      </p:grpSpPr>
+      <p:sp>
+        <p:nvSpPr>
+          <p:cNvPr id="2" name="Title 1">
+            <a:extLst>
+              <a:ext uri="{FF2B5EF4-FFF2-40B4-BE49-F238E27FC236}">
+                <a16:creationId xmlns:a16="http://schemas.microsoft.com/office/drawing/2014/main" id="{2AE41FBF-37F6-4109-8EFF-29AE2B543539}"/>
+              </a:ext>
+            </a:extLst>
+          </p:cNvPr>
+          <p:cNvSpPr>
+            <a:spLocks noGrp="1"/>
+          </p:cNvSpPr>
+          <p:nvPr>
+            <p:ph type="title"/>
+          </p:nvPr>
+        </p:nvSpPr>
+        <p:spPr>
+          <a:xfrm>
+            <a:off x="581192" y="702156"/>
+            <a:ext cx="11029616" cy="578004"/>
+          </a:xfrm>
+        </p:spPr>
+        <p:txBody>
+          <a:bodyPr/>
+          <a:lstStyle/>
+          <a:p>
+            <a:r>
+              <a:rPr lang="en-US" dirty="0"/>
+              <a:t>Connected service</a:t>
+            </a:r>
+          </a:p>
+        </p:txBody>
+      </p:sp>
+      <p:pic>
+        <p:nvPicPr>
+          <p:cNvPr id="5" name="Picture 4">
+            <a:extLst>
+              <a:ext uri="{FF2B5EF4-FFF2-40B4-BE49-F238E27FC236}">
+                <a16:creationId xmlns:a16="http://schemas.microsoft.com/office/drawing/2014/main" id="{A75ED83F-BFE3-47E9-871D-9140C9A57475}"/>
+              </a:ext>
+            </a:extLst>
+          </p:cNvPr>
+          <p:cNvPicPr>
+            <a:picLocks noChangeAspect="1"/>
+          </p:cNvPicPr>
+          <p:nvPr/>
+        </p:nvPicPr>
+        <p:blipFill>
+          <a:blip r:embed="rId2"/>
+          <a:stretch>
+            <a:fillRect/>
+          </a:stretch>
+        </p:blipFill>
+        <p:spPr>
+          <a:xfrm>
+            <a:off x="0" y="1325588"/>
+            <a:ext cx="12192000" cy="4206824"/>
+          </a:xfrm>
+          <a:prstGeom prst="rect">
+            <a:avLst/>
+          </a:prstGeom>
+        </p:spPr>
+      </p:pic>
+    </p:spTree>
+    <p:extLst>
+      <p:ext uri="{BB962C8B-B14F-4D97-AF65-F5344CB8AC3E}">
+        <p14:creationId xmlns:p14="http://schemas.microsoft.com/office/powerpoint/2010/main" val="3218729667"/>
+      </p:ext>
+    </p:extLst>
+  </p:cSld>
+  <p:clrMapOvr>
+    <a:masterClrMapping/>
+  </p:clrMapOvr>
+</p:sld>
+</file>
+
+<file path=ppt/slides/slide14.xml><?xml version="1.0" encoding="utf-8"?>
+<p:sld xmlns:a="http://schemas.openxmlformats.org/drawingml/2006/main" xmlns:r="http://schemas.openxmlformats.org/officeDocument/2006/relationships" xmlns:p="http://schemas.openxmlformats.org/presentationml/2006/main">
+  <p:cSld>
+    <p:spTree>
+      <p:nvGrpSpPr>
+        <p:cNvPr id="1" name=""/>
+        <p:cNvGrpSpPr/>
+        <p:nvPr/>
+      </p:nvGrpSpPr>
+      <p:grpSpPr>
+        <a:xfrm>
+          <a:off x="0" y="0"/>
+          <a:ext cx="0" cy="0"/>
+          <a:chOff x="0" y="0"/>
+          <a:chExt cx="0" cy="0"/>
+        </a:xfrm>
+      </p:grpSpPr>
+      <p:sp>
+        <p:nvSpPr>
+          <p:cNvPr id="2" name="Title 1">
+            <a:extLst>
+              <a:ext uri="{FF2B5EF4-FFF2-40B4-BE49-F238E27FC236}">
+                <a16:creationId xmlns:a16="http://schemas.microsoft.com/office/drawing/2014/main" id="{F8A7B6D1-575A-4632-AA39-15646447B3BC}"/>
+              </a:ext>
+            </a:extLst>
+          </p:cNvPr>
+          <p:cNvSpPr>
+            <a:spLocks noGrp="1"/>
+          </p:cNvSpPr>
+          <p:nvPr>
+            <p:ph type="title"/>
+          </p:nvPr>
+        </p:nvSpPr>
+        <p:spPr>
+          <a:xfrm>
+            <a:off x="581192" y="702156"/>
+            <a:ext cx="11029616" cy="474841"/>
+          </a:xfrm>
+        </p:spPr>
+        <p:txBody>
+          <a:bodyPr>
+            <a:normAutofit fontScale="90000"/>
+          </a:bodyPr>
+          <a:lstStyle/>
+          <a:p>
+            <a:r>
+              <a:rPr lang="en-US" dirty="0"/>
+              <a:t>Connected service</a:t>
+            </a:r>
+          </a:p>
+        </p:txBody>
+      </p:sp>
+      <p:pic>
+        <p:nvPicPr>
+          <p:cNvPr id="5" name="Picture 4">
+            <a:extLst>
+              <a:ext uri="{FF2B5EF4-FFF2-40B4-BE49-F238E27FC236}">
+                <a16:creationId xmlns:a16="http://schemas.microsoft.com/office/drawing/2014/main" id="{CB16B62A-D3F6-4927-9569-719456ABBA4D}"/>
+              </a:ext>
+            </a:extLst>
+          </p:cNvPr>
+          <p:cNvPicPr>
+            <a:picLocks noChangeAspect="1"/>
+          </p:cNvPicPr>
+          <p:nvPr/>
+        </p:nvPicPr>
+        <p:blipFill>
+          <a:blip r:embed="rId2"/>
+          <a:stretch>
+            <a:fillRect/>
+          </a:stretch>
+        </p:blipFill>
+        <p:spPr>
+          <a:xfrm>
+            <a:off x="0" y="1355187"/>
+            <a:ext cx="9711503" cy="5104228"/>
+          </a:xfrm>
+          <a:prstGeom prst="rect">
+            <a:avLst/>
+          </a:prstGeom>
+        </p:spPr>
+      </p:pic>
+    </p:spTree>
+    <p:extLst>
+      <p:ext uri="{BB962C8B-B14F-4D97-AF65-F5344CB8AC3E}">
+        <p14:creationId xmlns:p14="http://schemas.microsoft.com/office/powerpoint/2010/main" val="1768910109"/>
+      </p:ext>
+    </p:extLst>
+  </p:cSld>
+  <p:clrMapOvr>
+    <a:masterClrMapping/>
+  </p:clrMapOvr>
+</p:sld>
+</file>
+
+<file path=ppt/slides/slide15.xml><?xml version="1.0" encoding="utf-8"?>
+<p:sld xmlns:a="http://schemas.openxmlformats.org/drawingml/2006/main" xmlns:r="http://schemas.openxmlformats.org/officeDocument/2006/relationships" xmlns:p="http://schemas.openxmlformats.org/presentationml/2006/main">
+  <p:cSld>
+    <p:spTree>
+      <p:nvGrpSpPr>
+        <p:cNvPr id="1" name=""/>
+        <p:cNvGrpSpPr/>
+        <p:nvPr/>
+      </p:nvGrpSpPr>
+      <p:grpSpPr>
+        <a:xfrm>
+          <a:off x="0" y="0"/>
+          <a:ext cx="0" cy="0"/>
+          <a:chOff x="0" y="0"/>
+          <a:chExt cx="0" cy="0"/>
+        </a:xfrm>
+      </p:grpSpPr>
+      <p:sp>
+        <p:nvSpPr>
+          <p:cNvPr id="2" name="Title 1">
+            <a:extLst>
+              <a:ext uri="{FF2B5EF4-FFF2-40B4-BE49-F238E27FC236}">
+                <a16:creationId xmlns:a16="http://schemas.microsoft.com/office/drawing/2014/main" id="{CE953D72-8D78-4B52-AF81-3017D4EB0DAB}"/>
+              </a:ext>
+            </a:extLst>
+          </p:cNvPr>
+          <p:cNvSpPr>
+            <a:spLocks noGrp="1"/>
+          </p:cNvSpPr>
+          <p:nvPr>
+            <p:ph type="title"/>
+          </p:nvPr>
+        </p:nvSpPr>
+        <p:spPr>
+          <a:xfrm>
+            <a:off x="581192" y="702156"/>
+            <a:ext cx="11029616" cy="366989"/>
+          </a:xfrm>
+        </p:spPr>
+        <p:txBody>
+          <a:bodyPr>
+            <a:normAutofit fontScale="90000"/>
+          </a:bodyPr>
+          <a:lstStyle/>
+          <a:p>
+            <a:r>
+              <a:rPr lang="en-US" dirty="0"/>
+              <a:t>Connected service - proto</a:t>
+            </a:r>
+          </a:p>
+        </p:txBody>
+      </p:sp>
+      <p:pic>
+        <p:nvPicPr>
+          <p:cNvPr id="7" name="Picture 6">
+            <a:extLst>
+              <a:ext uri="{FF2B5EF4-FFF2-40B4-BE49-F238E27FC236}">
+                <a16:creationId xmlns:a16="http://schemas.microsoft.com/office/drawing/2014/main" id="{39728DB5-ED44-420F-995C-241BD90A1BA9}"/>
+              </a:ext>
+            </a:extLst>
+          </p:cNvPr>
+          <p:cNvPicPr>
+            <a:picLocks noChangeAspect="1"/>
+          </p:cNvPicPr>
+          <p:nvPr/>
+        </p:nvPicPr>
+        <p:blipFill>
+          <a:blip r:embed="rId2"/>
+          <a:stretch>
+            <a:fillRect/>
+          </a:stretch>
+        </p:blipFill>
+        <p:spPr>
+          <a:xfrm>
+            <a:off x="0" y="1261403"/>
+            <a:ext cx="9761328" cy="5437162"/>
+          </a:xfrm>
+          <a:prstGeom prst="rect">
+            <a:avLst/>
+          </a:prstGeom>
+        </p:spPr>
+      </p:pic>
+    </p:spTree>
+    <p:extLst>
+      <p:ext uri="{BB962C8B-B14F-4D97-AF65-F5344CB8AC3E}">
+        <p14:creationId xmlns:p14="http://schemas.microsoft.com/office/powerpoint/2010/main" val="126019074"/>
+      </p:ext>
+    </p:extLst>
+  </p:cSld>
+  <p:clrMapOvr>
+    <a:masterClrMapping/>
+  </p:clrMapOvr>
+</p:sld>
+</file>
+
+<file path=ppt/slides/slide16.xml><?xml version="1.0" encoding="utf-8"?>
+<p:sld xmlns:a="http://schemas.openxmlformats.org/drawingml/2006/main" xmlns:r="http://schemas.openxmlformats.org/officeDocument/2006/relationships" xmlns:p="http://schemas.openxmlformats.org/presentationml/2006/main">
+  <p:cSld>
+    <p:spTree>
+      <p:nvGrpSpPr>
+        <p:cNvPr id="1" name=""/>
+        <p:cNvGrpSpPr/>
+        <p:nvPr/>
+      </p:nvGrpSpPr>
+      <p:grpSpPr>
+        <a:xfrm>
+          <a:off x="0" y="0"/>
+          <a:ext cx="0" cy="0"/>
+          <a:chOff x="0" y="0"/>
+          <a:chExt cx="0" cy="0"/>
+        </a:xfrm>
+      </p:grpSpPr>
+      <p:sp>
+        <p:nvSpPr>
+          <p:cNvPr id="2" name="Title 1">
+            <a:extLst>
+              <a:ext uri="{FF2B5EF4-FFF2-40B4-BE49-F238E27FC236}">
+                <a16:creationId xmlns:a16="http://schemas.microsoft.com/office/drawing/2014/main" id="{B65D345E-6DDE-422C-A9D4-99FE150CE3F9}"/>
+              </a:ext>
+            </a:extLst>
+          </p:cNvPr>
+          <p:cNvSpPr>
+            <a:spLocks noGrp="1"/>
+          </p:cNvSpPr>
+          <p:nvPr>
+            <p:ph type="title"/>
+          </p:nvPr>
+        </p:nvSpPr>
+        <p:spPr>
+          <a:xfrm>
+            <a:off x="581192" y="702156"/>
+            <a:ext cx="11029616" cy="531112"/>
+          </a:xfrm>
+        </p:spPr>
+        <p:txBody>
+          <a:bodyPr/>
+          <a:lstStyle/>
+          <a:p>
+            <a:endParaRPr lang="en-US" dirty="0"/>
+          </a:p>
+        </p:txBody>
+      </p:sp>
+      <p:pic>
+        <p:nvPicPr>
+          <p:cNvPr id="5" name="Picture 4">
+            <a:extLst>
+              <a:ext uri="{FF2B5EF4-FFF2-40B4-BE49-F238E27FC236}">
+                <a16:creationId xmlns:a16="http://schemas.microsoft.com/office/drawing/2014/main" id="{4F124073-948F-495B-B6D7-57087C64A62B}"/>
+              </a:ext>
+            </a:extLst>
+          </p:cNvPr>
+          <p:cNvPicPr>
+            <a:picLocks noChangeAspect="1"/>
+          </p:cNvPicPr>
+          <p:nvPr/>
+        </p:nvPicPr>
+        <p:blipFill>
+          <a:blip r:embed="rId2"/>
+          <a:stretch>
+            <a:fillRect/>
+          </a:stretch>
+        </p:blipFill>
+        <p:spPr>
+          <a:xfrm>
+            <a:off x="0" y="1373945"/>
+            <a:ext cx="9793648" cy="5484055"/>
+          </a:xfrm>
+          <a:prstGeom prst="rect">
+            <a:avLst/>
+          </a:prstGeom>
+        </p:spPr>
+      </p:pic>
+    </p:spTree>
+    <p:extLst>
+      <p:ext uri="{BB962C8B-B14F-4D97-AF65-F5344CB8AC3E}">
+        <p14:creationId xmlns:p14="http://schemas.microsoft.com/office/powerpoint/2010/main" val="1594733595"/>
+      </p:ext>
+    </p:extLst>
+  </p:cSld>
+  <p:clrMapOvr>
+    <a:masterClrMapping/>
+  </p:clrMapOvr>
+</p:sld>
+</file>
+
+<file path=ppt/slides/slide17.xml><?xml version="1.0" encoding="utf-8"?>
+<p:sld xmlns:a="http://schemas.openxmlformats.org/drawingml/2006/main" xmlns:r="http://schemas.openxmlformats.org/officeDocument/2006/relationships" xmlns:p="http://schemas.openxmlformats.org/presentationml/2006/main">
+  <p:cSld>
+    <p:spTree>
+      <p:nvGrpSpPr>
+        <p:cNvPr id="1" name=""/>
+        <p:cNvGrpSpPr/>
+        <p:nvPr/>
+      </p:nvGrpSpPr>
+      <p:grpSpPr>
+        <a:xfrm>
+          <a:off x="0" y="0"/>
+          <a:ext cx="0" cy="0"/>
+          <a:chOff x="0" y="0"/>
+          <a:chExt cx="0" cy="0"/>
+        </a:xfrm>
+      </p:grpSpPr>
+      <p:sp>
+        <p:nvSpPr>
+          <p:cNvPr id="2" name="Title 1">
+            <a:extLst>
+              <a:ext uri="{FF2B5EF4-FFF2-40B4-BE49-F238E27FC236}">
+                <a16:creationId xmlns:a16="http://schemas.microsoft.com/office/drawing/2014/main" id="{E150C41D-17B6-4C67-9FC1-6B6FBB589636}"/>
+              </a:ext>
+            </a:extLst>
+          </p:cNvPr>
+          <p:cNvSpPr>
+            <a:spLocks noGrp="1"/>
+          </p:cNvSpPr>
+          <p:nvPr>
+            <p:ph type="title"/>
+          </p:nvPr>
+        </p:nvSpPr>
+        <p:spPr>
+          <a:xfrm>
+            <a:off x="581192" y="702156"/>
+            <a:ext cx="11029616" cy="474841"/>
+          </a:xfrm>
+        </p:spPr>
+        <p:txBody>
+          <a:bodyPr>
+            <a:normAutofit fontScale="90000"/>
+          </a:bodyPr>
+          <a:lstStyle/>
+          <a:p>
+            <a:endParaRPr lang="en-US" dirty="0"/>
+          </a:p>
+        </p:txBody>
+      </p:sp>
+      <p:pic>
+        <p:nvPicPr>
+          <p:cNvPr id="5" name="Picture 4">
+            <a:extLst>
+              <a:ext uri="{FF2B5EF4-FFF2-40B4-BE49-F238E27FC236}">
+                <a16:creationId xmlns:a16="http://schemas.microsoft.com/office/drawing/2014/main" id="{2394AC2B-687A-4948-8B14-C0EAE5BC7DFD}"/>
+              </a:ext>
+            </a:extLst>
+          </p:cNvPr>
+          <p:cNvPicPr>
+            <a:picLocks noChangeAspect="1"/>
+          </p:cNvPicPr>
+          <p:nvPr/>
+        </p:nvPicPr>
+        <p:blipFill>
+          <a:blip r:embed="rId2"/>
+          <a:stretch>
+            <a:fillRect/>
+          </a:stretch>
+        </p:blipFill>
+        <p:spPr>
+          <a:xfrm>
+            <a:off x="0" y="1365737"/>
+            <a:ext cx="9949195" cy="5376203"/>
+          </a:xfrm>
+          <a:prstGeom prst="rect">
+            <a:avLst/>
+          </a:prstGeom>
+        </p:spPr>
+      </p:pic>
+      <p:pic>
+        <p:nvPicPr>
+          <p:cNvPr id="7" name="Picture 6">
+            <a:extLst>
+              <a:ext uri="{FF2B5EF4-FFF2-40B4-BE49-F238E27FC236}">
+                <a16:creationId xmlns:a16="http://schemas.microsoft.com/office/drawing/2014/main" id="{A549D80E-9165-4B3F-9580-B66F80CA9469}"/>
+              </a:ext>
+            </a:extLst>
+          </p:cNvPr>
+          <p:cNvPicPr>
+            <a:picLocks noChangeAspect="1"/>
+          </p:cNvPicPr>
+          <p:nvPr/>
+        </p:nvPicPr>
+        <p:blipFill>
+          <a:blip r:embed="rId3"/>
+          <a:stretch>
+            <a:fillRect/>
+          </a:stretch>
+        </p:blipFill>
+        <p:spPr>
+          <a:xfrm>
+            <a:off x="7704406" y="2002959"/>
+            <a:ext cx="4487594" cy="4333875"/>
+          </a:xfrm>
+          <a:prstGeom prst="rect">
+            <a:avLst/>
+          </a:prstGeom>
+        </p:spPr>
+      </p:pic>
+    </p:spTree>
+    <p:extLst>
+      <p:ext uri="{BB962C8B-B14F-4D97-AF65-F5344CB8AC3E}">
+        <p14:creationId xmlns:p14="http://schemas.microsoft.com/office/powerpoint/2010/main" val="3151463469"/>
+      </p:ext>
+    </p:extLst>
+  </p:cSld>
+  <p:clrMapOvr>
+    <a:masterClrMapping/>
+  </p:clrMapOvr>
+</p:sld>
+</file>
+
+<file path=ppt/slides/slide18.xml><?xml version="1.0" encoding="utf-8"?>
+<p:sld xmlns:a="http://schemas.openxmlformats.org/drawingml/2006/main" xmlns:r="http://schemas.openxmlformats.org/officeDocument/2006/relationships" xmlns:p="http://schemas.openxmlformats.org/presentationml/2006/main">
+  <p:cSld>
+    <p:spTree>
+      <p:nvGrpSpPr>
+        <p:cNvPr id="1" name=""/>
+        <p:cNvGrpSpPr/>
+        <p:nvPr/>
+      </p:nvGrpSpPr>
+      <p:grpSpPr>
+        <a:xfrm>
+          <a:off x="0" y="0"/>
+          <a:ext cx="0" cy="0"/>
+          <a:chOff x="0" y="0"/>
+          <a:chExt cx="0" cy="0"/>
+        </a:xfrm>
+      </p:grpSpPr>
+      <p:sp>
+        <p:nvSpPr>
+          <p:cNvPr id="2" name="Title 1">
+            <a:extLst>
+              <a:ext uri="{FF2B5EF4-FFF2-40B4-BE49-F238E27FC236}">
+                <a16:creationId xmlns:a16="http://schemas.microsoft.com/office/drawing/2014/main" id="{C2DBBA33-8C9E-432E-8D8F-35489B075336}"/>
+              </a:ext>
+            </a:extLst>
+          </p:cNvPr>
+          <p:cNvSpPr>
+            <a:spLocks noGrp="1"/>
+          </p:cNvSpPr>
+          <p:nvPr>
+            <p:ph type="title"/>
+          </p:nvPr>
+        </p:nvSpPr>
+        <p:spPr>
+          <a:xfrm>
+            <a:off x="581192" y="702156"/>
+            <a:ext cx="11029616" cy="474841"/>
+          </a:xfrm>
+        </p:spPr>
+        <p:txBody>
+          <a:bodyPr>
+            <a:normAutofit fontScale="90000"/>
+          </a:bodyPr>
+          <a:lstStyle/>
+          <a:p>
+            <a:endParaRPr lang="en-US" dirty="0"/>
+          </a:p>
+        </p:txBody>
+      </p:sp>
+      <p:pic>
+        <p:nvPicPr>
+          <p:cNvPr id="5" name="Picture 4">
+            <a:extLst>
+              <a:ext uri="{FF2B5EF4-FFF2-40B4-BE49-F238E27FC236}">
+                <a16:creationId xmlns:a16="http://schemas.microsoft.com/office/drawing/2014/main" id="{ABE7DDD9-B03E-49CA-9448-1E5D31F25DB5}"/>
+              </a:ext>
+            </a:extLst>
+          </p:cNvPr>
+          <p:cNvPicPr>
+            <a:picLocks noChangeAspect="1"/>
+          </p:cNvPicPr>
+          <p:nvPr/>
+        </p:nvPicPr>
+        <p:blipFill>
+          <a:blip r:embed="rId2"/>
+          <a:stretch>
+            <a:fillRect/>
+          </a:stretch>
+        </p:blipFill>
+        <p:spPr>
+          <a:xfrm>
+            <a:off x="0" y="1445298"/>
+            <a:ext cx="12192000" cy="2072955"/>
+          </a:xfrm>
+          <a:prstGeom prst="rect">
+            <a:avLst/>
+          </a:prstGeom>
+        </p:spPr>
+      </p:pic>
+      <p:pic>
+        <p:nvPicPr>
+          <p:cNvPr id="7" name="Picture 6">
+            <a:extLst>
+              <a:ext uri="{FF2B5EF4-FFF2-40B4-BE49-F238E27FC236}">
+                <a16:creationId xmlns:a16="http://schemas.microsoft.com/office/drawing/2014/main" id="{E76B0FFC-C40A-444A-B668-676DF701A495}"/>
+              </a:ext>
+            </a:extLst>
+          </p:cNvPr>
+          <p:cNvPicPr>
+            <a:picLocks noChangeAspect="1"/>
+          </p:cNvPicPr>
+          <p:nvPr/>
+        </p:nvPicPr>
+        <p:blipFill>
+          <a:blip r:embed="rId3"/>
+          <a:stretch>
+            <a:fillRect/>
+          </a:stretch>
+        </p:blipFill>
+        <p:spPr>
+          <a:xfrm>
+            <a:off x="0" y="3850962"/>
+            <a:ext cx="12192000" cy="1969614"/>
+          </a:xfrm>
+          <a:prstGeom prst="rect">
+            <a:avLst/>
+          </a:prstGeom>
+        </p:spPr>
+      </p:pic>
+    </p:spTree>
+    <p:extLst>
+      <p:ext uri="{BB962C8B-B14F-4D97-AF65-F5344CB8AC3E}">
+        <p14:creationId xmlns:p14="http://schemas.microsoft.com/office/powerpoint/2010/main" val="1190408631"/>
       </p:ext>
     </p:extLst>
   </p:cSld>

</xml_diff>